<commit_message>
Adjusting the storlet writing and deploying guide to include python
The guide is broken into three parts as follows:
A language independent guide and two language specific
complimentary guides.

While at it the programming model UML was
simplified to include only what the storlet
writer should care about.

Bonus 1: Adjusted all docs to use the same heading
         format
Bonus 2: Moved to archive two outdated .rst to archive

Change-Id: I945f410aa96af1895c66856537ff392d5c18be25
</commit_message>
<xml_diff>
--- a/doc/source/images/storlet_engine_drawing.pptx
+++ b/doc/source/images/storlet_engine_drawing.pptx
@@ -7,6 +7,7 @@
   <p:sldIdLst>
     <p:sldId id="257" r:id="rId2"/>
     <p:sldId id="258" r:id="rId3"/>
+    <p:sldId id="259" r:id="rId4"/>
   </p:sldIdLst>
   <p:sldSz cx="9144000" cy="6858000" type="screen4x3"/>
   <p:notesSz cx="6858000" cy="9144000"/>
@@ -289,7 +290,7 @@
           <a:p>
             <a:fld id="{5631AA5F-5E66-B742-AE5C-459D9949F4C6}" type="datetimeFigureOut">
               <a:rPr lang="en-US" smtClean="0"/>
-              <a:t>6/9/16</a:t>
+              <a:t>9/29/16</a:t>
             </a:fld>
             <a:endParaRPr lang="en-US"/>
           </a:p>
@@ -459,7 +460,7 @@
           <a:p>
             <a:fld id="{5631AA5F-5E66-B742-AE5C-459D9949F4C6}" type="datetimeFigureOut">
               <a:rPr lang="en-US" smtClean="0"/>
-              <a:t>6/9/16</a:t>
+              <a:t>9/29/16</a:t>
             </a:fld>
             <a:endParaRPr lang="en-US"/>
           </a:p>
@@ -639,7 +640,7 @@
           <a:p>
             <a:fld id="{5631AA5F-5E66-B742-AE5C-459D9949F4C6}" type="datetimeFigureOut">
               <a:rPr lang="en-US" smtClean="0"/>
-              <a:t>6/9/16</a:t>
+              <a:t>9/29/16</a:t>
             </a:fld>
             <a:endParaRPr lang="en-US"/>
           </a:p>
@@ -809,7 +810,7 @@
           <a:p>
             <a:fld id="{5631AA5F-5E66-B742-AE5C-459D9949F4C6}" type="datetimeFigureOut">
               <a:rPr lang="en-US" smtClean="0"/>
-              <a:t>6/9/16</a:t>
+              <a:t>9/29/16</a:t>
             </a:fld>
             <a:endParaRPr lang="en-US"/>
           </a:p>
@@ -1055,7 +1056,7 @@
           <a:p>
             <a:fld id="{5631AA5F-5E66-B742-AE5C-459D9949F4C6}" type="datetimeFigureOut">
               <a:rPr lang="en-US" smtClean="0"/>
-              <a:t>6/9/16</a:t>
+              <a:t>9/29/16</a:t>
             </a:fld>
             <a:endParaRPr lang="en-US"/>
           </a:p>
@@ -1343,7 +1344,7 @@
           <a:p>
             <a:fld id="{5631AA5F-5E66-B742-AE5C-459D9949F4C6}" type="datetimeFigureOut">
               <a:rPr lang="en-US" smtClean="0"/>
-              <a:t>6/9/16</a:t>
+              <a:t>9/29/16</a:t>
             </a:fld>
             <a:endParaRPr lang="en-US"/>
           </a:p>
@@ -1765,7 +1766,7 @@
           <a:p>
             <a:fld id="{5631AA5F-5E66-B742-AE5C-459D9949F4C6}" type="datetimeFigureOut">
               <a:rPr lang="en-US" smtClean="0"/>
-              <a:t>6/9/16</a:t>
+              <a:t>9/29/16</a:t>
             </a:fld>
             <a:endParaRPr lang="en-US"/>
           </a:p>
@@ -1883,7 +1884,7 @@
           <a:p>
             <a:fld id="{5631AA5F-5E66-B742-AE5C-459D9949F4C6}" type="datetimeFigureOut">
               <a:rPr lang="en-US" smtClean="0"/>
-              <a:t>6/9/16</a:t>
+              <a:t>9/29/16</a:t>
             </a:fld>
             <a:endParaRPr lang="en-US"/>
           </a:p>
@@ -1978,7 +1979,7 @@
           <a:p>
             <a:fld id="{5631AA5F-5E66-B742-AE5C-459D9949F4C6}" type="datetimeFigureOut">
               <a:rPr lang="en-US" smtClean="0"/>
-              <a:t>6/9/16</a:t>
+              <a:t>9/29/16</a:t>
             </a:fld>
             <a:endParaRPr lang="en-US"/>
           </a:p>
@@ -2255,7 +2256,7 @@
           <a:p>
             <a:fld id="{5631AA5F-5E66-B742-AE5C-459D9949F4C6}" type="datetimeFigureOut">
               <a:rPr lang="en-US" smtClean="0"/>
-              <a:t>6/9/16</a:t>
+              <a:t>9/29/16</a:t>
             </a:fld>
             <a:endParaRPr lang="en-US"/>
           </a:p>
@@ -2508,7 +2509,7 @@
           <a:p>
             <a:fld id="{5631AA5F-5E66-B742-AE5C-459D9949F4C6}" type="datetimeFigureOut">
               <a:rPr lang="en-US" smtClean="0"/>
-              <a:t>6/9/16</a:t>
+              <a:t>9/29/16</a:t>
             </a:fld>
             <a:endParaRPr lang="en-US"/>
           </a:p>
@@ -2721,7 +2722,7 @@
           <a:p>
             <a:fld id="{5631AA5F-5E66-B742-AE5C-459D9949F4C6}" type="datetimeFigureOut">
               <a:rPr lang="en-US" smtClean="0"/>
-              <a:t>6/9/16</a:t>
+              <a:t>9/29/16</a:t>
             </a:fld>
             <a:endParaRPr lang="en-US"/>
           </a:p>
@@ -5072,185 +5073,6 @@
       </p:sp>
       <p:sp>
         <p:nvSpPr>
-          <p:cNvPr id="32" name="Rectangle 31"/>
-          <p:cNvSpPr/>
-          <p:nvPr/>
-        </p:nvSpPr>
-        <p:spPr>
-          <a:xfrm>
-            <a:off x="635000" y="2791319"/>
-            <a:ext cx="3596211" cy="550478"/>
-          </a:xfrm>
-          <a:prstGeom prst="rect">
-            <a:avLst/>
-          </a:prstGeom>
-          <a:ln/>
-        </p:spPr>
-        <p:style>
-          <a:lnRef idx="2">
-            <a:schemeClr val="dk1"/>
-          </a:lnRef>
-          <a:fillRef idx="1">
-            <a:schemeClr val="lt1"/>
-          </a:fillRef>
-          <a:effectRef idx="0">
-            <a:schemeClr val="dk1"/>
-          </a:effectRef>
-          <a:fontRef idx="minor">
-            <a:schemeClr val="dk1"/>
-          </a:fontRef>
-        </p:style>
-        <p:txBody>
-          <a:bodyPr rtlCol="0" anchor="ctr" anchorCtr="0"/>
-          <a:lstStyle/>
-          <a:p>
-            <a:pPr algn="ctr"/>
-            <a:r>
-              <a:rPr lang="en-US" sz="1400" dirty="0" err="1" smtClean="0">
-                <a:ln>
-                  <a:solidFill>
-                    <a:schemeClr val="tx1"/>
-                  </a:solidFill>
-                </a:ln>
-                <a:solidFill>
-                  <a:schemeClr val="tx1"/>
-                </a:solidFill>
-                <a:latin typeface="Comic Sans MS"/>
-              </a:rPr>
-              <a:t>StorletOutputStream</a:t>
-            </a:r>
-            <a:endParaRPr lang="en-US" sz="1400" dirty="0" smtClean="0">
-              <a:ln>
-                <a:solidFill>
-                  <a:schemeClr val="tx1"/>
-                </a:solidFill>
-              </a:ln>
-              <a:solidFill>
-                <a:schemeClr val="tx1"/>
-              </a:solidFill>
-              <a:latin typeface="Comic Sans MS"/>
-            </a:endParaRPr>
-          </a:p>
-        </p:txBody>
-      </p:sp>
-      <p:sp>
-        <p:nvSpPr>
-          <p:cNvPr id="33" name="Rectangle 32"/>
-          <p:cNvSpPr/>
-          <p:nvPr/>
-        </p:nvSpPr>
-        <p:spPr>
-          <a:xfrm>
-            <a:off x="635000" y="3527907"/>
-            <a:ext cx="3596211" cy="770592"/>
-          </a:xfrm>
-          <a:prstGeom prst="rect">
-            <a:avLst/>
-          </a:prstGeom>
-          <a:ln/>
-        </p:spPr>
-        <p:style>
-          <a:lnRef idx="2">
-            <a:schemeClr val="dk1"/>
-          </a:lnRef>
-          <a:fillRef idx="1">
-            <a:schemeClr val="lt1"/>
-          </a:fillRef>
-          <a:effectRef idx="0">
-            <a:schemeClr val="dk1"/>
-          </a:effectRef>
-          <a:fontRef idx="minor">
-            <a:schemeClr val="dk1"/>
-          </a:fontRef>
-        </p:style>
-        <p:txBody>
-          <a:bodyPr rtlCol="0" anchor="t" anchorCtr="0"/>
-          <a:lstStyle/>
-          <a:p>
-            <a:r>
-              <a:rPr lang="en-US" sz="1100" dirty="0" smtClean="0"/>
-              <a:t>+ </a:t>
-            </a:r>
-            <a:r>
-              <a:rPr lang="en-US" sz="1100" dirty="0" err="1" smtClean="0"/>
-              <a:t>getMetadata</a:t>
-            </a:r>
-            <a:r>
-              <a:rPr lang="en-US" sz="1100" dirty="0" smtClean="0"/>
-              <a:t>: </a:t>
-            </a:r>
-            <a:r>
-              <a:rPr lang="en-US" sz="1100" dirty="0" err="1" smtClean="0"/>
-              <a:t>HashMap</a:t>
-            </a:r>
-            <a:r>
-              <a:rPr lang="en-US" sz="1100" dirty="0" smtClean="0"/>
-              <a:t>&lt;String, String&gt;</a:t>
-            </a:r>
-            <a:endParaRPr lang="en-US" sz="1100" dirty="0" smtClean="0">
-              <a:ln>
-                <a:solidFill>
-                  <a:schemeClr val="tx1"/>
-                </a:solidFill>
-              </a:ln>
-              <a:solidFill>
-                <a:schemeClr val="tx1"/>
-              </a:solidFill>
-            </a:endParaRPr>
-          </a:p>
-        </p:txBody>
-      </p:sp>
-      <p:sp>
-        <p:nvSpPr>
-          <p:cNvPr id="34" name="Rectangle 33"/>
-          <p:cNvSpPr/>
-          <p:nvPr/>
-        </p:nvSpPr>
-        <p:spPr>
-          <a:xfrm>
-            <a:off x="635001" y="3350111"/>
-            <a:ext cx="3596214" cy="169365"/>
-          </a:xfrm>
-          <a:prstGeom prst="rect">
-            <a:avLst/>
-          </a:prstGeom>
-          <a:ln/>
-        </p:spPr>
-        <p:style>
-          <a:lnRef idx="2">
-            <a:schemeClr val="dk1"/>
-          </a:lnRef>
-          <a:fillRef idx="1">
-            <a:schemeClr val="lt1"/>
-          </a:fillRef>
-          <a:effectRef idx="0">
-            <a:schemeClr val="dk1"/>
-          </a:effectRef>
-          <a:fontRef idx="minor">
-            <a:schemeClr val="dk1"/>
-          </a:fontRef>
-        </p:style>
-        <p:txBody>
-          <a:bodyPr rtlCol="0" anchor="ctr" anchorCtr="0"/>
-          <a:lstStyle/>
-          <a:p>
-            <a:pPr algn="ctr"/>
-            <a:endParaRPr lang="en-US" dirty="0" smtClean="0">
-              <a:ln>
-                <a:solidFill>
-                  <a:schemeClr val="tx1"/>
-                </a:solidFill>
-              </a:ln>
-              <a:solidFill>
-                <a:schemeClr val="tx1"/>
-              </a:solidFill>
-              <a:latin typeface="Comic Sans MS"/>
-            </a:endParaRPr>
-          </a:p>
-        </p:txBody>
-      </p:sp>
-      <p:sp>
-        <p:nvSpPr>
           <p:cNvPr id="35" name="Rectangle 34"/>
           <p:cNvSpPr/>
           <p:nvPr/>
@@ -5449,7 +5271,7 @@
         </p:nvSpPr>
         <p:spPr>
           <a:xfrm>
-            <a:off x="635001" y="4683619"/>
+            <a:off x="635010" y="2799633"/>
             <a:ext cx="3596208" cy="550478"/>
           </a:xfrm>
           <a:prstGeom prst="rect">
@@ -5512,7 +5334,7 @@
         </p:nvSpPr>
         <p:spPr>
           <a:xfrm>
-            <a:off x="635001" y="5420207"/>
+            <a:off x="635010" y="3536221"/>
             <a:ext cx="3596207" cy="770592"/>
           </a:xfrm>
           <a:prstGeom prst="rect">
@@ -5599,7 +5421,7 @@
         </p:nvSpPr>
         <p:spPr>
           <a:xfrm>
-            <a:off x="635000" y="5242411"/>
+            <a:off x="635009" y="3358425"/>
             <a:ext cx="3596211" cy="169365"/>
           </a:xfrm>
           <a:prstGeom prst="rect">
@@ -5640,49 +5462,694 @@
           </a:p>
         </p:txBody>
       </p:sp>
-      <p:cxnSp>
-        <p:nvCxnSpPr>
-          <p:cNvPr id="3" name="Straight Arrow Connector 2"/>
-          <p:cNvCxnSpPr>
-            <a:stCxn id="38" idx="0"/>
-            <a:endCxn id="33" idx="2"/>
-          </p:cNvCxnSpPr>
-          <p:nvPr/>
-        </p:nvCxnSpPr>
-        <p:spPr>
-          <a:xfrm flipV="1">
-            <a:off x="2433105" y="4298499"/>
-            <a:ext cx="1" cy="385120"/>
-          </a:xfrm>
-          <a:prstGeom prst="straightConnector1">
-            <a:avLst/>
-          </a:prstGeom>
-          <a:ln>
-            <a:solidFill>
-              <a:srgbClr val="000000"/>
-            </a:solidFill>
-            <a:tailEnd type="arrow"/>
-          </a:ln>
-        </p:spPr>
-        <p:style>
-          <a:lnRef idx="2">
-            <a:schemeClr val="accent1"/>
-          </a:lnRef>
-          <a:fillRef idx="0">
-            <a:schemeClr val="accent1"/>
-          </a:fillRef>
-          <a:effectRef idx="1">
-            <a:schemeClr val="accent1"/>
-          </a:effectRef>
-          <a:fontRef idx="minor">
-            <a:schemeClr val="tx1"/>
-          </a:fontRef>
-        </p:style>
-      </p:cxnSp>
     </p:spTree>
     <p:extLst>
       <p:ext uri="{BB962C8B-B14F-4D97-AF65-F5344CB8AC3E}">
         <p14:creationId xmlns:p14="http://schemas.microsoft.com/office/powerpoint/2010/main" val="1127001781"/>
+      </p:ext>
+    </p:extLst>
+  </p:cSld>
+  <p:clrMapOvr>
+    <a:masterClrMapping/>
+  </p:clrMapOvr>
+</p:sld>
+</file>
+
+<file path=ppt/slides/slide3.xml><?xml version="1.0" encoding="utf-8"?>
+<p:sld xmlns:a="http://schemas.openxmlformats.org/drawingml/2006/main" xmlns:r="http://schemas.openxmlformats.org/officeDocument/2006/relationships" xmlns:p="http://schemas.openxmlformats.org/presentationml/2006/main">
+  <p:cSld>
+    <p:spTree>
+      <p:nvGrpSpPr>
+        <p:cNvPr id="1" name=""/>
+        <p:cNvGrpSpPr/>
+        <p:nvPr/>
+      </p:nvGrpSpPr>
+      <p:grpSpPr>
+        <a:xfrm>
+          <a:off x="0" y="0"/>
+          <a:ext cx="0" cy="0"/>
+          <a:chOff x="0" y="0"/>
+          <a:chExt cx="0" cy="0"/>
+        </a:xfrm>
+      </p:grpSpPr>
+      <p:sp>
+        <p:nvSpPr>
+          <p:cNvPr id="26" name="Rectangle 25"/>
+          <p:cNvSpPr/>
+          <p:nvPr/>
+        </p:nvSpPr>
+        <p:spPr>
+          <a:xfrm>
+            <a:off x="635000" y="2223476"/>
+            <a:ext cx="3586462" cy="550478"/>
+          </a:xfrm>
+          <a:prstGeom prst="rect">
+            <a:avLst/>
+          </a:prstGeom>
+          <a:ln/>
+        </p:spPr>
+        <p:style>
+          <a:lnRef idx="2">
+            <a:schemeClr val="dk1"/>
+          </a:lnRef>
+          <a:fillRef idx="1">
+            <a:schemeClr val="lt1"/>
+          </a:fillRef>
+          <a:effectRef idx="0">
+            <a:schemeClr val="dk1"/>
+          </a:effectRef>
+          <a:fontRef idx="minor">
+            <a:schemeClr val="dk1"/>
+          </a:fontRef>
+        </p:style>
+        <p:txBody>
+          <a:bodyPr rtlCol="0" anchor="ctr" anchorCtr="0"/>
+          <a:lstStyle/>
+          <a:p>
+            <a:pPr algn="ctr"/>
+            <a:r>
+              <a:rPr lang="en-US" sz="1400" dirty="0" err="1" smtClean="0">
+                <a:ln>
+                  <a:solidFill>
+                    <a:schemeClr val="tx1"/>
+                  </a:solidFill>
+                </a:ln>
+                <a:solidFill>
+                  <a:schemeClr val="tx1"/>
+                </a:solidFill>
+                <a:latin typeface="Comic Sans MS"/>
+              </a:rPr>
+              <a:t>StorletLogger</a:t>
+            </a:r>
+            <a:endParaRPr lang="en-US" sz="1400" dirty="0" smtClean="0">
+              <a:ln>
+                <a:solidFill>
+                  <a:schemeClr val="tx1"/>
+                </a:solidFill>
+              </a:ln>
+              <a:solidFill>
+                <a:schemeClr val="tx1"/>
+              </a:solidFill>
+              <a:latin typeface="Comic Sans MS"/>
+            </a:endParaRPr>
+          </a:p>
+        </p:txBody>
+      </p:sp>
+      <p:sp>
+        <p:nvSpPr>
+          <p:cNvPr id="30" name="Rectangle 29"/>
+          <p:cNvSpPr/>
+          <p:nvPr/>
+        </p:nvSpPr>
+        <p:spPr>
+          <a:xfrm>
+            <a:off x="635000" y="2960064"/>
+            <a:ext cx="3586462" cy="770592"/>
+          </a:xfrm>
+          <a:prstGeom prst="rect">
+            <a:avLst/>
+          </a:prstGeom>
+          <a:ln/>
+        </p:spPr>
+        <p:style>
+          <a:lnRef idx="2">
+            <a:schemeClr val="dk1"/>
+          </a:lnRef>
+          <a:fillRef idx="1">
+            <a:schemeClr val="lt1"/>
+          </a:fillRef>
+          <a:effectRef idx="0">
+            <a:schemeClr val="dk1"/>
+          </a:effectRef>
+          <a:fontRef idx="minor">
+            <a:schemeClr val="dk1"/>
+          </a:fontRef>
+        </p:style>
+        <p:txBody>
+          <a:bodyPr rtlCol="0" anchor="t" anchorCtr="0"/>
+          <a:lstStyle/>
+          <a:p>
+            <a:r>
+              <a:rPr lang="en-US" sz="800" dirty="0"/>
+              <a:t>+ </a:t>
+            </a:r>
+            <a:r>
+              <a:rPr lang="en-US" sz="800" dirty="0" smtClean="0"/>
+              <a:t>debug</a:t>
+            </a:r>
+            <a:endParaRPr lang="en-US" sz="800" dirty="0">
+              <a:ln>
+                <a:solidFill>
+                  <a:schemeClr val="tx1"/>
+                </a:solidFill>
+              </a:ln>
+              <a:solidFill>
+                <a:schemeClr val="tx1"/>
+              </a:solidFill>
+            </a:endParaRPr>
+          </a:p>
+          <a:p>
+            <a:r>
+              <a:rPr lang="en-US" sz="800" dirty="0"/>
+              <a:t>+ </a:t>
+            </a:r>
+            <a:r>
+              <a:rPr lang="en-US" sz="800" dirty="0" smtClean="0"/>
+              <a:t>info</a:t>
+            </a:r>
+            <a:endParaRPr lang="en-US" sz="800" dirty="0">
+              <a:ln>
+                <a:solidFill>
+                  <a:schemeClr val="tx1"/>
+                </a:solidFill>
+              </a:ln>
+              <a:solidFill>
+                <a:schemeClr val="tx1"/>
+              </a:solidFill>
+            </a:endParaRPr>
+          </a:p>
+          <a:p>
+            <a:r>
+              <a:rPr lang="en-US" sz="800" dirty="0"/>
+              <a:t>+ </a:t>
+            </a:r>
+            <a:r>
+              <a:rPr lang="en-US" sz="800" dirty="0" smtClean="0"/>
+              <a:t>warn</a:t>
+            </a:r>
+            <a:endParaRPr lang="en-US" sz="800" dirty="0"/>
+          </a:p>
+          <a:p>
+            <a:r>
+              <a:rPr lang="en-US" sz="800" dirty="0"/>
+              <a:t>+ </a:t>
+            </a:r>
+            <a:r>
+              <a:rPr lang="en-US" sz="800" dirty="0" smtClean="0"/>
+              <a:t>error</a:t>
+            </a:r>
+            <a:endParaRPr lang="en-US" sz="800" dirty="0"/>
+          </a:p>
+          <a:p>
+            <a:r>
+              <a:rPr lang="en-US" sz="800" dirty="0"/>
+              <a:t>+ </a:t>
+            </a:r>
+            <a:r>
+              <a:rPr lang="en-US" sz="800" dirty="0" smtClean="0"/>
+              <a:t>exception</a:t>
+            </a:r>
+            <a:endParaRPr lang="en-US" sz="800" dirty="0"/>
+          </a:p>
+        </p:txBody>
+      </p:sp>
+      <p:sp>
+        <p:nvSpPr>
+          <p:cNvPr id="31" name="Rectangle 30"/>
+          <p:cNvSpPr/>
+          <p:nvPr/>
+        </p:nvSpPr>
+        <p:spPr>
+          <a:xfrm>
+            <a:off x="635003" y="2782268"/>
+            <a:ext cx="3586459" cy="169365"/>
+          </a:xfrm>
+          <a:prstGeom prst="rect">
+            <a:avLst/>
+          </a:prstGeom>
+          <a:ln/>
+        </p:spPr>
+        <p:style>
+          <a:lnRef idx="2">
+            <a:schemeClr val="dk1"/>
+          </a:lnRef>
+          <a:fillRef idx="1">
+            <a:schemeClr val="lt1"/>
+          </a:fillRef>
+          <a:effectRef idx="0">
+            <a:schemeClr val="dk1"/>
+          </a:effectRef>
+          <a:fontRef idx="minor">
+            <a:schemeClr val="dk1"/>
+          </a:fontRef>
+        </p:style>
+        <p:txBody>
+          <a:bodyPr rtlCol="0" anchor="ctr" anchorCtr="0"/>
+          <a:lstStyle/>
+          <a:p>
+            <a:pPr algn="ctr"/>
+            <a:endParaRPr lang="en-US" dirty="0" smtClean="0">
+              <a:ln>
+                <a:solidFill>
+                  <a:schemeClr val="tx1"/>
+                </a:solidFill>
+              </a:ln>
+              <a:solidFill>
+                <a:schemeClr val="tx1"/>
+              </a:solidFill>
+              <a:latin typeface="Comic Sans MS"/>
+            </a:endParaRPr>
+          </a:p>
+        </p:txBody>
+      </p:sp>
+      <p:sp>
+        <p:nvSpPr>
+          <p:cNvPr id="35" name="Rectangle 34"/>
+          <p:cNvSpPr/>
+          <p:nvPr/>
+        </p:nvSpPr>
+        <p:spPr>
+          <a:xfrm>
+            <a:off x="5087641" y="343876"/>
+            <a:ext cx="3586465" cy="550478"/>
+          </a:xfrm>
+          <a:prstGeom prst="rect">
+            <a:avLst/>
+          </a:prstGeom>
+          <a:ln/>
+        </p:spPr>
+        <p:style>
+          <a:lnRef idx="2">
+            <a:schemeClr val="dk1"/>
+          </a:lnRef>
+          <a:fillRef idx="1">
+            <a:schemeClr val="lt1"/>
+          </a:fillRef>
+          <a:effectRef idx="0">
+            <a:schemeClr val="dk1"/>
+          </a:effectRef>
+          <a:fontRef idx="minor">
+            <a:schemeClr val="dk1"/>
+          </a:fontRef>
+        </p:style>
+        <p:txBody>
+          <a:bodyPr rtlCol="0" anchor="ctr" anchorCtr="0"/>
+          <a:lstStyle/>
+          <a:p>
+            <a:pPr algn="ctr"/>
+            <a:r>
+              <a:rPr lang="en-US" sz="1400" dirty="0" err="1" smtClean="0">
+                <a:ln>
+                  <a:solidFill>
+                    <a:schemeClr val="tx1"/>
+                  </a:solidFill>
+                </a:ln>
+                <a:solidFill>
+                  <a:schemeClr val="tx1"/>
+                </a:solidFill>
+                <a:latin typeface="Comic Sans MS"/>
+              </a:rPr>
+              <a:t>StorletInputFile</a:t>
+            </a:r>
+            <a:endParaRPr lang="en-US" sz="1400" dirty="0" smtClean="0">
+              <a:ln>
+                <a:solidFill>
+                  <a:schemeClr val="tx1"/>
+                </a:solidFill>
+              </a:ln>
+              <a:solidFill>
+                <a:schemeClr val="tx1"/>
+              </a:solidFill>
+              <a:latin typeface="Comic Sans MS"/>
+            </a:endParaRPr>
+          </a:p>
+        </p:txBody>
+      </p:sp>
+      <p:sp>
+        <p:nvSpPr>
+          <p:cNvPr id="36" name="Rectangle 35"/>
+          <p:cNvSpPr/>
+          <p:nvPr/>
+        </p:nvSpPr>
+        <p:spPr>
+          <a:xfrm>
+            <a:off x="5087641" y="1080464"/>
+            <a:ext cx="3586465" cy="770592"/>
+          </a:xfrm>
+          <a:prstGeom prst="rect">
+            <a:avLst/>
+          </a:prstGeom>
+          <a:solidFill>
+            <a:schemeClr val="lt1"/>
+          </a:solidFill>
+          <a:ln/>
+          <a:effectLst/>
+        </p:spPr>
+        <p:style>
+          <a:lnRef idx="2">
+            <a:schemeClr val="dk1"/>
+          </a:lnRef>
+          <a:fillRef idx="1">
+            <a:schemeClr val="lt1"/>
+          </a:fillRef>
+          <a:effectRef idx="0">
+            <a:schemeClr val="dk1"/>
+          </a:effectRef>
+          <a:fontRef idx="minor">
+            <a:schemeClr val="dk1"/>
+          </a:fontRef>
+        </p:style>
+        <p:txBody>
+          <a:bodyPr rtlCol="0" anchor="t" anchorCtr="0"/>
+          <a:lstStyle/>
+          <a:p>
+            <a:r>
+              <a:rPr lang="en-US" sz="800" dirty="0"/>
+              <a:t>+ </a:t>
+            </a:r>
+            <a:r>
+              <a:rPr lang="en-US" sz="800" dirty="0" err="1" smtClean="0"/>
+              <a:t>get_metadata</a:t>
+            </a:r>
+            <a:endParaRPr lang="en-US" sz="800" dirty="0">
+              <a:ln>
+                <a:solidFill>
+                  <a:schemeClr val="tx1"/>
+                </a:solidFill>
+              </a:ln>
+              <a:solidFill>
+                <a:schemeClr val="tx1"/>
+              </a:solidFill>
+            </a:endParaRPr>
+          </a:p>
+          <a:p>
+            <a:r>
+              <a:rPr lang="en-US" sz="800" dirty="0"/>
+              <a:t>+ </a:t>
+            </a:r>
+            <a:r>
+              <a:rPr lang="en-US" sz="800" dirty="0" smtClean="0"/>
+              <a:t>read</a:t>
+            </a:r>
+            <a:endParaRPr lang="en-US" sz="800" dirty="0"/>
+          </a:p>
+          <a:p>
+            <a:r>
+              <a:rPr lang="en-US" sz="800" dirty="0"/>
+              <a:t>+ </a:t>
+            </a:r>
+            <a:r>
+              <a:rPr lang="en-US" sz="800" dirty="0" err="1" smtClean="0"/>
+              <a:t>readline</a:t>
+            </a:r>
+            <a:endParaRPr lang="en-US" sz="800" dirty="0"/>
+          </a:p>
+          <a:p>
+            <a:r>
+              <a:rPr lang="en-US" sz="800" dirty="0"/>
+              <a:t>+ </a:t>
+            </a:r>
+            <a:r>
+              <a:rPr lang="en-US" sz="800" dirty="0" err="1" smtClean="0"/>
+              <a:t>readlines</a:t>
+            </a:r>
+            <a:endParaRPr lang="en-US" sz="800" dirty="0"/>
+          </a:p>
+        </p:txBody>
+      </p:sp>
+      <p:sp>
+        <p:nvSpPr>
+          <p:cNvPr id="37" name="Rectangle 36"/>
+          <p:cNvSpPr/>
+          <p:nvPr/>
+        </p:nvSpPr>
+        <p:spPr>
+          <a:xfrm>
+            <a:off x="5087644" y="902668"/>
+            <a:ext cx="3586462" cy="169365"/>
+          </a:xfrm>
+          <a:prstGeom prst="rect">
+            <a:avLst/>
+          </a:prstGeom>
+          <a:ln/>
+        </p:spPr>
+        <p:style>
+          <a:lnRef idx="2">
+            <a:schemeClr val="dk1"/>
+          </a:lnRef>
+          <a:fillRef idx="1">
+            <a:schemeClr val="lt1"/>
+          </a:fillRef>
+          <a:effectRef idx="0">
+            <a:schemeClr val="dk1"/>
+          </a:effectRef>
+          <a:fontRef idx="minor">
+            <a:schemeClr val="dk1"/>
+          </a:fontRef>
+        </p:style>
+        <p:txBody>
+          <a:bodyPr rtlCol="0" anchor="ctr" anchorCtr="0"/>
+          <a:lstStyle/>
+          <a:p>
+            <a:pPr algn="ctr"/>
+            <a:endParaRPr lang="en-US" dirty="0" smtClean="0">
+              <a:ln>
+                <a:solidFill>
+                  <a:schemeClr val="tx1"/>
+                </a:solidFill>
+              </a:ln>
+              <a:solidFill>
+                <a:schemeClr val="tx1"/>
+              </a:solidFill>
+              <a:latin typeface="Comic Sans MS"/>
+            </a:endParaRPr>
+          </a:p>
+        </p:txBody>
+      </p:sp>
+      <p:sp>
+        <p:nvSpPr>
+          <p:cNvPr id="38" name="Rectangle 37"/>
+          <p:cNvSpPr/>
+          <p:nvPr/>
+        </p:nvSpPr>
+        <p:spPr>
+          <a:xfrm>
+            <a:off x="635001" y="280376"/>
+            <a:ext cx="3596208" cy="550478"/>
+          </a:xfrm>
+          <a:prstGeom prst="rect">
+            <a:avLst/>
+          </a:prstGeom>
+          <a:ln/>
+        </p:spPr>
+        <p:style>
+          <a:lnRef idx="2">
+            <a:schemeClr val="dk1"/>
+          </a:lnRef>
+          <a:fillRef idx="1">
+            <a:schemeClr val="lt1"/>
+          </a:fillRef>
+          <a:effectRef idx="0">
+            <a:schemeClr val="dk1"/>
+          </a:effectRef>
+          <a:fontRef idx="minor">
+            <a:schemeClr val="dk1"/>
+          </a:fontRef>
+        </p:style>
+        <p:txBody>
+          <a:bodyPr rtlCol="0" anchor="ctr" anchorCtr="0"/>
+          <a:lstStyle/>
+          <a:p>
+            <a:pPr algn="ctr"/>
+            <a:r>
+              <a:rPr lang="en-US" sz="1400" dirty="0" err="1" smtClean="0">
+                <a:ln>
+                  <a:solidFill>
+                    <a:schemeClr val="tx1"/>
+                  </a:solidFill>
+                </a:ln>
+                <a:solidFill>
+                  <a:schemeClr val="tx1"/>
+                </a:solidFill>
+                <a:latin typeface="Comic Sans MS"/>
+              </a:rPr>
+              <a:t>StorletOutputFile</a:t>
+            </a:r>
+            <a:endParaRPr lang="en-US" sz="1400" dirty="0" smtClean="0">
+              <a:ln>
+                <a:solidFill>
+                  <a:schemeClr val="tx1"/>
+                </a:solidFill>
+              </a:ln>
+              <a:solidFill>
+                <a:schemeClr val="tx1"/>
+              </a:solidFill>
+              <a:latin typeface="Comic Sans MS"/>
+            </a:endParaRPr>
+          </a:p>
+        </p:txBody>
+      </p:sp>
+      <p:sp>
+        <p:nvSpPr>
+          <p:cNvPr id="39" name="Rectangle 38"/>
+          <p:cNvSpPr/>
+          <p:nvPr/>
+        </p:nvSpPr>
+        <p:spPr>
+          <a:xfrm>
+            <a:off x="635001" y="1016964"/>
+            <a:ext cx="3596207" cy="770592"/>
+          </a:xfrm>
+          <a:prstGeom prst="rect">
+            <a:avLst/>
+          </a:prstGeom>
+          <a:ln/>
+        </p:spPr>
+        <p:style>
+          <a:lnRef idx="2">
+            <a:schemeClr val="dk1"/>
+          </a:lnRef>
+          <a:fillRef idx="1">
+            <a:schemeClr val="lt1"/>
+          </a:fillRef>
+          <a:effectRef idx="0">
+            <a:schemeClr val="dk1"/>
+          </a:effectRef>
+          <a:fontRef idx="minor">
+            <a:schemeClr val="dk1"/>
+          </a:fontRef>
+        </p:style>
+        <p:txBody>
+          <a:bodyPr rtlCol="0" anchor="t" anchorCtr="0"/>
+          <a:lstStyle/>
+          <a:p>
+            <a:r>
+              <a:rPr lang="en-US" sz="800" dirty="0" smtClean="0"/>
+              <a:t>+ </a:t>
+            </a:r>
+            <a:r>
+              <a:rPr lang="en-US" sz="800" dirty="0" err="1" smtClean="0"/>
+              <a:t>get_metadata</a:t>
+            </a:r>
+            <a:endParaRPr lang="en-US" sz="800" dirty="0">
+              <a:ln>
+                <a:solidFill>
+                  <a:schemeClr val="tx1"/>
+                </a:solidFill>
+              </a:ln>
+              <a:solidFill>
+                <a:schemeClr val="tx1"/>
+              </a:solidFill>
+            </a:endParaRPr>
+          </a:p>
+          <a:p>
+            <a:r>
+              <a:rPr lang="en-US" sz="800" dirty="0" smtClean="0"/>
+              <a:t>+ </a:t>
+            </a:r>
+            <a:r>
+              <a:rPr lang="en-US" sz="800" dirty="0" err="1" smtClean="0"/>
+              <a:t>set_metadata</a:t>
+            </a:r>
+            <a:endParaRPr lang="en-US" sz="800" dirty="0">
+              <a:ln>
+                <a:solidFill>
+                  <a:schemeClr val="tx1"/>
+                </a:solidFill>
+              </a:ln>
+              <a:solidFill>
+                <a:schemeClr val="tx1"/>
+              </a:solidFill>
+            </a:endParaRPr>
+          </a:p>
+          <a:p>
+            <a:r>
+              <a:rPr lang="en-US" sz="800" dirty="0"/>
+              <a:t>+ </a:t>
+            </a:r>
+            <a:r>
+              <a:rPr lang="en-US" sz="800" dirty="0" smtClean="0"/>
+              <a:t>close</a:t>
+            </a:r>
+            <a:endParaRPr lang="en-US" sz="800" dirty="0" smtClean="0"/>
+          </a:p>
+          <a:p>
+            <a:r>
+              <a:rPr lang="en-US" sz="800" dirty="0"/>
+              <a:t>+ </a:t>
+            </a:r>
+            <a:r>
+              <a:rPr lang="en-US" sz="800" dirty="0" smtClean="0"/>
+              <a:t>write</a:t>
+            </a:r>
+          </a:p>
+          <a:p>
+            <a:r>
+              <a:rPr lang="en-US" sz="800" dirty="0"/>
+              <a:t>+ </a:t>
+            </a:r>
+            <a:r>
+              <a:rPr lang="en-US" sz="800" dirty="0" err="1" smtClean="0"/>
+              <a:t>writelines</a:t>
+            </a:r>
+            <a:endParaRPr lang="en-US" sz="800" dirty="0"/>
+          </a:p>
+          <a:p>
+            <a:r>
+              <a:rPr lang="en-US" sz="800" dirty="0"/>
+              <a:t>+ </a:t>
+            </a:r>
+            <a:r>
+              <a:rPr lang="en-US" sz="800" dirty="0" smtClean="0"/>
+              <a:t>flush</a:t>
+            </a:r>
+            <a:endParaRPr lang="en-US" sz="800" dirty="0"/>
+          </a:p>
+        </p:txBody>
+      </p:sp>
+      <p:sp>
+        <p:nvSpPr>
+          <p:cNvPr id="40" name="Rectangle 39"/>
+          <p:cNvSpPr/>
+          <p:nvPr/>
+        </p:nvSpPr>
+        <p:spPr>
+          <a:xfrm>
+            <a:off x="635000" y="839168"/>
+            <a:ext cx="3596211" cy="169365"/>
+          </a:xfrm>
+          <a:prstGeom prst="rect">
+            <a:avLst/>
+          </a:prstGeom>
+          <a:ln/>
+        </p:spPr>
+        <p:style>
+          <a:lnRef idx="2">
+            <a:schemeClr val="dk1"/>
+          </a:lnRef>
+          <a:fillRef idx="1">
+            <a:schemeClr val="lt1"/>
+          </a:fillRef>
+          <a:effectRef idx="0">
+            <a:schemeClr val="dk1"/>
+          </a:effectRef>
+          <a:fontRef idx="minor">
+            <a:schemeClr val="dk1"/>
+          </a:fontRef>
+        </p:style>
+        <p:txBody>
+          <a:bodyPr rtlCol="0" anchor="ctr" anchorCtr="0"/>
+          <a:lstStyle/>
+          <a:p>
+            <a:pPr algn="ctr"/>
+            <a:endParaRPr lang="en-US" dirty="0" smtClean="0">
+              <a:ln>
+                <a:solidFill>
+                  <a:schemeClr val="tx1"/>
+                </a:solidFill>
+              </a:ln>
+              <a:solidFill>
+                <a:schemeClr val="tx1"/>
+              </a:solidFill>
+              <a:latin typeface="Comic Sans MS"/>
+            </a:endParaRPr>
+          </a:p>
+        </p:txBody>
+      </p:sp>
+    </p:spTree>
+    <p:extLst>
+      <p:ext uri="{BB962C8B-B14F-4D97-AF65-F5344CB8AC3E}">
+        <p14:creationId xmlns:p14="http://schemas.microsoft.com/office/powerpoint/2010/main" val="1839848858"/>
       </p:ext>
     </p:extLst>
   </p:cSld>

</xml_diff>